<commit_message>
week 11 in-class notes
</commit_message>
<xml_diff>
--- a/course_material/week_11/week_11_presentation.pptx
+++ b/course_material/week_11/week_11_presentation.pptx
@@ -1836,7 +1836,7 @@
           <a:p>
             <a:fld id="{5CF9EFDB-215C-4120-ADCB-EAD745B7163E}" type="datetimeFigureOut">
               <a:rPr lang="en-US" smtClean="0"/>
-              <a:t>11/21/2021</a:t>
+              <a:t>12/1/2021</a:t>
             </a:fld>
             <a:endParaRPr lang="en-US"/>
           </a:p>
@@ -2729,7 +2729,7 @@
           <a:p>
             <a:fld id="{ACF1A1B0-862D-4909-A7DB-D8ADA062DFCA}" type="datetimeFigureOut">
               <a:rPr lang="en-US" dirty="0"/>
-              <a:t>11/21/2021</a:t>
+              <a:t>12/1/2021</a:t>
             </a:fld>
             <a:endParaRPr lang="en-US"/>
           </a:p>
@@ -2952,7 +2952,7 @@
           <a:p>
             <a:fld id="{7B156144-9CB7-4E3A-B87E-A382F9BE05EF}" type="datetimeFigureOut">
               <a:rPr lang="en-US" dirty="0"/>
-              <a:t>11/21/2021</a:t>
+              <a:t>12/1/2021</a:t>
             </a:fld>
             <a:endParaRPr lang="en-US"/>
           </a:p>
@@ -3130,7 +3130,7 @@
           <a:p>
             <a:fld id="{2643D55F-46AB-4791-9172-4FA8DD3A6A9C}" type="datetimeFigureOut">
               <a:rPr lang="en-US" dirty="0"/>
-              <a:t>11/21/2021</a:t>
+              <a:t>12/1/2021</a:t>
             </a:fld>
             <a:endParaRPr lang="en-US"/>
           </a:p>
@@ -3298,7 +3298,7 @@
           <a:p>
             <a:fld id="{58026881-8A08-449C-8D73-E5F201F814C1}" type="datetimeFigureOut">
               <a:rPr lang="en-US" dirty="0"/>
-              <a:t>11/21/2021</a:t>
+              <a:t>12/1/2021</a:t>
             </a:fld>
             <a:endParaRPr lang="en-US"/>
           </a:p>
@@ -3588,7 +3588,7 @@
           <a:p>
             <a:fld id="{1BEB5A5E-0C07-4E93-A112-D37B4D166B30}" type="datetimeFigureOut">
               <a:rPr lang="en-US" dirty="0"/>
-              <a:t>11/21/2021</a:t>
+              <a:t>12/1/2021</a:t>
             </a:fld>
             <a:endParaRPr lang="en-US"/>
           </a:p>
@@ -3911,7 +3911,7 @@
           <a:p>
             <a:fld id="{9E1F71C5-DC57-4358-A1EA-30C08AF6E3C5}" type="datetimeFigureOut">
               <a:rPr lang="en-US" dirty="0"/>
-              <a:t>11/21/2021</a:t>
+              <a:t>12/1/2021</a:t>
             </a:fld>
             <a:endParaRPr lang="en-US"/>
           </a:p>
@@ -4320,7 +4320,7 @@
           <a:p>
             <a:fld id="{12571DBA-DE60-4731-B773-47AAA185C143}" type="datetimeFigureOut">
               <a:rPr lang="en-US" dirty="0"/>
-              <a:t>11/21/2021</a:t>
+              <a:t>12/1/2021</a:t>
             </a:fld>
             <a:endParaRPr lang="en-US"/>
           </a:p>
@@ -4437,7 +4437,7 @@
           <a:p>
             <a:fld id="{4F170639-886C-4FCF-9EAB-ABB5DA3F3F4A}" type="datetimeFigureOut">
               <a:rPr lang="en-US" dirty="0"/>
-              <a:t>11/21/2021</a:t>
+              <a:t>12/1/2021</a:t>
             </a:fld>
             <a:endParaRPr lang="en-US"/>
           </a:p>
@@ -4532,7 +4532,7 @@
           <a:p>
             <a:fld id="{34C4A628-C83B-4C66-83F4-1711CE3738FD}" type="datetimeFigureOut">
               <a:rPr lang="en-US" dirty="0"/>
-              <a:t>11/21/2021</a:t>
+              <a:t>12/1/2021</a:t>
             </a:fld>
             <a:endParaRPr lang="en-US"/>
           </a:p>
@@ -4817,7 +4817,7 @@
           <a:p>
             <a:fld id="{B88C1D73-9400-43CA-A37F-F9B7D00DE14C}" type="datetimeFigureOut">
               <a:rPr lang="en-US" dirty="0"/>
-              <a:t>11/21/2021</a:t>
+              <a:t>12/1/2021</a:t>
             </a:fld>
             <a:endParaRPr lang="en-US"/>
           </a:p>
@@ -5089,7 +5089,7 @@
           <a:p>
             <a:fld id="{188B7711-B905-4633-B4D7-6F3A49A2E7D9}" type="datetimeFigureOut">
               <a:rPr lang="en-US" dirty="0"/>
-              <a:t>11/21/2021</a:t>
+              <a:t>12/1/2021</a:t>
             </a:fld>
             <a:endParaRPr lang="en-US"/>
           </a:p>
@@ -5339,7 +5339,7 @@
             <a:fld id="{89C235CF-BDA2-4E7E-8BBD-350479985E74}" type="datetimeFigureOut">
               <a:rPr lang="en-US" dirty="0"/>
               <a:pPr/>
-              <a:t>11/21/2021</a:t>
+              <a:t>12/1/2021</a:t>
             </a:fld>
             <a:endParaRPr lang="en-US"/>
           </a:p>
@@ -6271,15 +6271,8 @@
                 <a:effectLst/>
                 <a:latin typeface="Slack-Lato"/>
               </a:rPr>
-              <a:t>OutstandingOpsEngineer</a:t>
-            </a:r>
-            <a:endParaRPr lang="en-US" dirty="0">
-              <a:solidFill>
-                <a:schemeClr val="tx1"/>
-              </a:solidFill>
-            </a:endParaRPr>
-          </a:p>
-          <a:p>
+              <a:t>QuirkyQA</a:t>
+            </a:r>
             <a:endParaRPr lang="en-US" dirty="0">
               <a:solidFill>
                 <a:schemeClr val="tx1"/>
@@ -6724,7 +6717,15 @@
           <a:p>
             <a:r>
               <a:rPr lang="en-US" dirty="0"/>
-              <a:t>Review Homework (20 mins)</a:t>
+              <a:t>Review </a:t>
+            </a:r>
+            <a:r>
+              <a:rPr lang="en-US"/>
+              <a:t>Homework (15 </a:t>
+            </a:r>
+            <a:r>
+              <a:rPr lang="en-US" dirty="0"/>
+              <a:t>mins)</a:t>
             </a:r>
           </a:p>
           <a:p>
@@ -6742,7 +6743,7 @@
           <a:p>
             <a:r>
               <a:rPr lang="en-US" dirty="0"/>
-              <a:t>Time Series Analysis in Python (20 mins)</a:t>
+              <a:t>Time Series Analysis in Python (25 mins)</a:t>
             </a:r>
           </a:p>
           <a:p>

</xml_diff>